<commit_message>
change names to links in eg, fix dom
</commit_message>
<xml_diff>
--- a/rmd_files/w2/figures/html_dom.pptx
+++ b/rmd_files/w2/figures/html_dom.pptx
@@ -3536,18 +3536,13 @@
           <a:p>
             <a:pPr algn="ctr"/>
             <a:r>
-              <a:rPr lang="en-US" sz="1400">
+              <a:rPr lang="en-US" sz="1400" dirty="0">
                 <a:solidFill>
                   <a:sysClr val="windowText" lastClr="000000"/>
                 </a:solidFill>
               </a:rPr>
               <a:t>Head</a:t>
             </a:r>
-            <a:endParaRPr lang="en-US" sz="1400" dirty="0">
-              <a:solidFill>
-                <a:sysClr val="windowText" lastClr="000000"/>
-              </a:solidFill>
-            </a:endParaRPr>
           </a:p>
         </p:txBody>
       </p:sp>
@@ -3978,7 +3973,7 @@
                   <a:sysClr val="windowText" lastClr="000000"/>
                 </a:solidFill>
               </a:rPr>
-              <a:t>link2</a:t>
+              <a:t>link1</a:t>
             </a:r>
           </a:p>
         </p:txBody>
@@ -4067,7 +4062,7 @@
                   <a:sysClr val="windowText" lastClr="000000"/>
                 </a:solidFill>
               </a:rPr>
-              <a:t>/path/to/link2</a:t>
+              <a:t>/path/to/link1</a:t>
             </a:r>
           </a:p>
         </p:txBody>

</xml_diff>